<commit_message>
review of studies presentation
</commit_message>
<xml_diff>
--- a/MusicTherapy.pptx
+++ b/MusicTherapy.pptx
@@ -22573,13 +22573,13 @@
   <p:clrMapOvr>
     <a:masterClrMapping/>
   </p:clrMapOvr>
-  <mc:AlternateContent xmlns:mc="http://schemas.openxmlformats.org/markup-compatibility/2006">
-    <mc:Choice xmlns:p15="http://schemas.microsoft.com/office/powerpoint/2012/main" Requires="p15">
+  <mc:AlternateContent xmlns:mc="http://schemas.openxmlformats.org/markup-compatibility/2006" xmlns:p15="http://schemas.microsoft.com/office/powerpoint/2012/main">
+    <mc:Choice Requires="p15">
       <p:transition xmlns:p14="http://schemas.microsoft.com/office/powerpoint/2010/main" spd="slow" p14:dur="6000">
         <p15:prstTrans prst="curtains"/>
       </p:transition>
     </mc:Choice>
-    <mc:Fallback>
+    <mc:Fallback xmlns="">
       <p:transition spd="slow">
         <p:fade/>
       </p:transition>
@@ -25139,11 +25139,11 @@
   <p:clrMapOvr>
     <a:masterClrMapping/>
   </p:clrMapOvr>
-  <mc:AlternateContent xmlns:mc="http://schemas.openxmlformats.org/markup-compatibility/2006">
-    <mc:Choice xmlns:p14="http://schemas.microsoft.com/office/powerpoint/2010/main" Requires="p14">
+  <mc:AlternateContent xmlns:mc="http://schemas.openxmlformats.org/markup-compatibility/2006" xmlns:p14="http://schemas.microsoft.com/office/powerpoint/2010/main">
+    <mc:Choice Requires="p14">
       <p:transition p14:dur="10"/>
     </mc:Choice>
-    <mc:Fallback>
+    <mc:Fallback xmlns="">
       <p:transition/>
     </mc:Fallback>
   </mc:AlternateContent>

</xml_diff>